<commit_message>
frontend app init and login
</commit_message>
<xml_diff>
--- a/Presentations/DS-course-4-frontend.pptx
+++ b/Presentations/DS-course-4-frontend.pptx
@@ -5,13 +5,20 @@
     <p:sldMasterId id="2147483648" r:id="rId1"/>
   </p:sldMasterIdLst>
   <p:notesMasterIdLst>
-    <p:notesMasterId r:id="rId6"/>
+    <p:notesMasterId r:id="rId13"/>
   </p:notesMasterIdLst>
   <p:sldIdLst>
     <p:sldId id="257" r:id="rId2"/>
     <p:sldId id="258" r:id="rId3"/>
     <p:sldId id="276" r:id="rId4"/>
     <p:sldId id="372" r:id="rId5"/>
+    <p:sldId id="352" r:id="rId6"/>
+    <p:sldId id="373" r:id="rId7"/>
+    <p:sldId id="374" r:id="rId8"/>
+    <p:sldId id="375" r:id="rId9"/>
+    <p:sldId id="376" r:id="rId10"/>
+    <p:sldId id="378" r:id="rId11"/>
+    <p:sldId id="379" r:id="rId12"/>
   </p:sldIdLst>
   <p:sldSz cx="12192000" cy="6858000"/>
   <p:notesSz cx="6858000" cy="9144000"/>
@@ -200,7 +207,7 @@
           <a:p>
             <a:fld id="{16B0145C-99AC-4644-A36E-A4ECBC555925}" type="datetimeFigureOut">
               <a:rPr lang="en-US" smtClean="0"/>
-              <a:t>8/24/2022</a:t>
+              <a:t>8/26/2022</a:t>
             </a:fld>
             <a:endParaRPr lang="en-US"/>
           </a:p>
@@ -872,7 +879,7 @@
           <a:p>
             <a:fld id="{973BC00D-352D-4681-8132-8CC5EB9D512D}" type="datetimeFigureOut">
               <a:rPr lang="en-US" smtClean="0"/>
-              <a:t>8/24/2022</a:t>
+              <a:t>8/26/2022</a:t>
             </a:fld>
             <a:endParaRPr lang="en-US"/>
           </a:p>
@@ -1070,7 +1077,7 @@
           <a:p>
             <a:fld id="{973BC00D-352D-4681-8132-8CC5EB9D512D}" type="datetimeFigureOut">
               <a:rPr lang="en-US" smtClean="0"/>
-              <a:t>8/24/2022</a:t>
+              <a:t>8/26/2022</a:t>
             </a:fld>
             <a:endParaRPr lang="en-US"/>
           </a:p>
@@ -1278,7 +1285,7 @@
           <a:p>
             <a:fld id="{973BC00D-352D-4681-8132-8CC5EB9D512D}" type="datetimeFigureOut">
               <a:rPr lang="en-US" smtClean="0"/>
-              <a:t>8/24/2022</a:t>
+              <a:t>8/26/2022</a:t>
             </a:fld>
             <a:endParaRPr lang="en-US"/>
           </a:p>
@@ -1476,7 +1483,7 @@
           <a:p>
             <a:fld id="{973BC00D-352D-4681-8132-8CC5EB9D512D}" type="datetimeFigureOut">
               <a:rPr lang="en-US" smtClean="0"/>
-              <a:t>8/24/2022</a:t>
+              <a:t>8/26/2022</a:t>
             </a:fld>
             <a:endParaRPr lang="en-US"/>
           </a:p>
@@ -1751,7 +1758,7 @@
           <a:p>
             <a:fld id="{973BC00D-352D-4681-8132-8CC5EB9D512D}" type="datetimeFigureOut">
               <a:rPr lang="en-US" smtClean="0"/>
-              <a:t>8/24/2022</a:t>
+              <a:t>8/26/2022</a:t>
             </a:fld>
             <a:endParaRPr lang="en-US"/>
           </a:p>
@@ -2016,7 +2023,7 @@
           <a:p>
             <a:fld id="{973BC00D-352D-4681-8132-8CC5EB9D512D}" type="datetimeFigureOut">
               <a:rPr lang="en-US" smtClean="0"/>
-              <a:t>8/24/2022</a:t>
+              <a:t>8/26/2022</a:t>
             </a:fld>
             <a:endParaRPr lang="en-US"/>
           </a:p>
@@ -2428,7 +2435,7 @@
           <a:p>
             <a:fld id="{973BC00D-352D-4681-8132-8CC5EB9D512D}" type="datetimeFigureOut">
               <a:rPr lang="en-US" smtClean="0"/>
-              <a:t>8/24/2022</a:t>
+              <a:t>8/26/2022</a:t>
             </a:fld>
             <a:endParaRPr lang="en-US"/>
           </a:p>
@@ -2569,7 +2576,7 @@
           <a:p>
             <a:fld id="{973BC00D-352D-4681-8132-8CC5EB9D512D}" type="datetimeFigureOut">
               <a:rPr lang="en-US" smtClean="0"/>
-              <a:t>8/24/2022</a:t>
+              <a:t>8/26/2022</a:t>
             </a:fld>
             <a:endParaRPr lang="en-US"/>
           </a:p>
@@ -2682,7 +2689,7 @@
           <a:p>
             <a:fld id="{973BC00D-352D-4681-8132-8CC5EB9D512D}" type="datetimeFigureOut">
               <a:rPr lang="en-US" smtClean="0"/>
-              <a:t>8/24/2022</a:t>
+              <a:t>8/26/2022</a:t>
             </a:fld>
             <a:endParaRPr lang="en-US"/>
           </a:p>
@@ -2993,7 +3000,7 @@
           <a:p>
             <a:fld id="{973BC00D-352D-4681-8132-8CC5EB9D512D}" type="datetimeFigureOut">
               <a:rPr lang="en-US" smtClean="0"/>
-              <a:t>8/24/2022</a:t>
+              <a:t>8/26/2022</a:t>
             </a:fld>
             <a:endParaRPr lang="en-US"/>
           </a:p>
@@ -3281,7 +3288,7 @@
           <a:p>
             <a:fld id="{973BC00D-352D-4681-8132-8CC5EB9D512D}" type="datetimeFigureOut">
               <a:rPr lang="en-US" smtClean="0"/>
-              <a:t>8/24/2022</a:t>
+              <a:t>8/26/2022</a:t>
             </a:fld>
             <a:endParaRPr lang="en-US"/>
           </a:p>
@@ -3522,7 +3529,7 @@
           <a:p>
             <a:fld id="{973BC00D-352D-4681-8132-8CC5EB9D512D}" type="datetimeFigureOut">
               <a:rPr lang="en-US" smtClean="0"/>
-              <a:t>8/24/2022</a:t>
+              <a:t>8/26/2022</a:t>
             </a:fld>
             <a:endParaRPr lang="en-US"/>
           </a:p>
@@ -4138,6 +4145,329 @@
 </p:sld>
 </file>
 
+<file path=ppt/slides/slide10.xml><?xml version="1.0" encoding="utf-8"?>
+<p:sld xmlns:a="http://schemas.openxmlformats.org/drawingml/2006/main" xmlns:r="http://schemas.openxmlformats.org/officeDocument/2006/relationships" xmlns:p="http://schemas.openxmlformats.org/presentationml/2006/main">
+  <p:cSld>
+    <p:spTree>
+      <p:nvGrpSpPr>
+        <p:cNvPr id="1" name=""/>
+        <p:cNvGrpSpPr/>
+        <p:nvPr/>
+      </p:nvGrpSpPr>
+      <p:grpSpPr>
+        <a:xfrm>
+          <a:off x="0" y="0"/>
+          <a:ext cx="0" cy="0"/>
+          <a:chOff x="0" y="0"/>
+          <a:chExt cx="0" cy="0"/>
+        </a:xfrm>
+      </p:grpSpPr>
+      <p:sp>
+        <p:nvSpPr>
+          <p:cNvPr id="2" name="TextBox 1">
+            <a:extLst>
+              <a:ext uri="{FF2B5EF4-FFF2-40B4-BE49-F238E27FC236}">
+                <a16:creationId xmlns:a16="http://schemas.microsoft.com/office/drawing/2014/main" id="{2F95C7AD-28A6-6FFA-F6A5-977AB6EDBB6E}"/>
+              </a:ext>
+            </a:extLst>
+          </p:cNvPr>
+          <p:cNvSpPr txBox="1"/>
+          <p:nvPr/>
+        </p:nvSpPr>
+        <p:spPr>
+          <a:xfrm>
+            <a:off x="3397415" y="314625"/>
+            <a:ext cx="4172809" cy="769441"/>
+          </a:xfrm>
+          <a:prstGeom prst="rect">
+            <a:avLst/>
+          </a:prstGeom>
+          <a:noFill/>
+        </p:spPr>
+        <p:txBody>
+          <a:bodyPr wrap="none" rtlCol="0">
+            <a:spAutoFit/>
+          </a:bodyPr>
+          <a:lstStyle/>
+          <a:p>
+            <a:r>
+              <a:rPr lang="da-DK" sz="4400" dirty="0"/>
+              <a:t>Test state storage</a:t>
+            </a:r>
+            <a:endParaRPr lang="en-US" sz="4400" dirty="0"/>
+          </a:p>
+        </p:txBody>
+      </p:sp>
+      <p:sp>
+        <p:nvSpPr>
+          <p:cNvPr id="3" name="TextBox 2">
+            <a:extLst>
+              <a:ext uri="{FF2B5EF4-FFF2-40B4-BE49-F238E27FC236}">
+                <a16:creationId xmlns:a16="http://schemas.microsoft.com/office/drawing/2014/main" id="{C58B6763-E146-6C0C-77B8-4D4745DBD649}"/>
+              </a:ext>
+            </a:extLst>
+          </p:cNvPr>
+          <p:cNvSpPr txBox="1"/>
+          <p:nvPr/>
+        </p:nvSpPr>
+        <p:spPr>
+          <a:xfrm>
+            <a:off x="636693" y="1625600"/>
+            <a:ext cx="6230103" cy="369332"/>
+          </a:xfrm>
+          <a:prstGeom prst="rect">
+            <a:avLst/>
+          </a:prstGeom>
+          <a:noFill/>
+        </p:spPr>
+        <p:txBody>
+          <a:bodyPr wrap="none" rtlCol="0">
+            <a:spAutoFit/>
+          </a:bodyPr>
+          <a:lstStyle/>
+          <a:p>
+            <a:r>
+              <a:rPr lang="en-US" dirty="0"/>
+              <a:t>Add a click handler on the login page that updates the data page</a:t>
+            </a:r>
+          </a:p>
+        </p:txBody>
+      </p:sp>
+      <p:pic>
+        <p:nvPicPr>
+          <p:cNvPr id="6" name="Picture 5">
+            <a:extLst>
+              <a:ext uri="{FF2B5EF4-FFF2-40B4-BE49-F238E27FC236}">
+                <a16:creationId xmlns:a16="http://schemas.microsoft.com/office/drawing/2014/main" id="{79087C41-5A5C-653A-4A9D-1FAB0C6B51BC}"/>
+              </a:ext>
+            </a:extLst>
+          </p:cNvPr>
+          <p:cNvPicPr>
+            <a:picLocks noChangeAspect="1"/>
+          </p:cNvPicPr>
+          <p:nvPr/>
+        </p:nvPicPr>
+        <p:blipFill>
+          <a:blip r:embed="rId2"/>
+          <a:stretch>
+            <a:fillRect/>
+          </a:stretch>
+        </p:blipFill>
+        <p:spPr>
+          <a:xfrm>
+            <a:off x="1633429" y="2894918"/>
+            <a:ext cx="7700779" cy="2584691"/>
+          </a:xfrm>
+          <a:prstGeom prst="rect">
+            <a:avLst/>
+          </a:prstGeom>
+        </p:spPr>
+      </p:pic>
+    </p:spTree>
+    <p:extLst>
+      <p:ext uri="{BB962C8B-B14F-4D97-AF65-F5344CB8AC3E}">
+        <p14:creationId xmlns:p14="http://schemas.microsoft.com/office/powerpoint/2010/main" val="992770438"/>
+      </p:ext>
+    </p:extLst>
+  </p:cSld>
+  <p:clrMapOvr>
+    <a:masterClrMapping/>
+  </p:clrMapOvr>
+</p:sld>
+</file>
+
+<file path=ppt/slides/slide11.xml><?xml version="1.0" encoding="utf-8"?>
+<p:sld xmlns:a="http://schemas.openxmlformats.org/drawingml/2006/main" xmlns:r="http://schemas.openxmlformats.org/officeDocument/2006/relationships" xmlns:p="http://schemas.openxmlformats.org/presentationml/2006/main">
+  <p:cSld>
+    <p:spTree>
+      <p:nvGrpSpPr>
+        <p:cNvPr id="1" name=""/>
+        <p:cNvGrpSpPr/>
+        <p:nvPr/>
+      </p:nvGrpSpPr>
+      <p:grpSpPr>
+        <a:xfrm>
+          <a:off x="0" y="0"/>
+          <a:ext cx="0" cy="0"/>
+          <a:chOff x="0" y="0"/>
+          <a:chExt cx="0" cy="0"/>
+        </a:xfrm>
+      </p:grpSpPr>
+      <p:sp>
+        <p:nvSpPr>
+          <p:cNvPr id="2" name="TextBox 1">
+            <a:extLst>
+              <a:ext uri="{FF2B5EF4-FFF2-40B4-BE49-F238E27FC236}">
+                <a16:creationId xmlns:a16="http://schemas.microsoft.com/office/drawing/2014/main" id="{2F95C7AD-28A6-6FFA-F6A5-977AB6EDBB6E}"/>
+              </a:ext>
+            </a:extLst>
+          </p:cNvPr>
+          <p:cNvSpPr txBox="1"/>
+          <p:nvPr/>
+        </p:nvSpPr>
+        <p:spPr>
+          <a:xfrm>
+            <a:off x="3397415" y="314625"/>
+            <a:ext cx="4200894" cy="769441"/>
+          </a:xfrm>
+          <a:prstGeom prst="rect">
+            <a:avLst/>
+          </a:prstGeom>
+          <a:noFill/>
+        </p:spPr>
+        <p:txBody>
+          <a:bodyPr wrap="none" rtlCol="0">
+            <a:spAutoFit/>
+          </a:bodyPr>
+          <a:lstStyle/>
+          <a:p>
+            <a:r>
+              <a:rPr lang="da-DK" sz="4400" dirty="0"/>
+              <a:t>Login page layout</a:t>
+            </a:r>
+            <a:endParaRPr lang="en-US" sz="4400" dirty="0"/>
+          </a:p>
+        </p:txBody>
+      </p:sp>
+      <p:sp>
+        <p:nvSpPr>
+          <p:cNvPr id="3" name="TextBox 2">
+            <a:extLst>
+              <a:ext uri="{FF2B5EF4-FFF2-40B4-BE49-F238E27FC236}">
+                <a16:creationId xmlns:a16="http://schemas.microsoft.com/office/drawing/2014/main" id="{C58B6763-E146-6C0C-77B8-4D4745DBD649}"/>
+              </a:ext>
+            </a:extLst>
+          </p:cNvPr>
+          <p:cNvSpPr txBox="1"/>
+          <p:nvPr/>
+        </p:nvSpPr>
+        <p:spPr>
+          <a:xfrm>
+            <a:off x="636693" y="1625600"/>
+            <a:ext cx="8176790" cy="923330"/>
+          </a:xfrm>
+          <a:prstGeom prst="rect">
+            <a:avLst/>
+          </a:prstGeom>
+          <a:noFill/>
+        </p:spPr>
+        <p:txBody>
+          <a:bodyPr wrap="none" rtlCol="0">
+            <a:spAutoFit/>
+          </a:bodyPr>
+          <a:lstStyle/>
+          <a:p>
+            <a:r>
+              <a:rPr lang="en-US" dirty="0"/>
+              <a:t>Install </a:t>
+            </a:r>
+            <a:r>
+              <a:rPr lang="en-US" dirty="0" err="1"/>
+              <a:t>dhi</a:t>
+            </a:r>
+            <a:r>
+              <a:rPr lang="en-US" dirty="0"/>
+              <a:t>/react-components to get material-</a:t>
+            </a:r>
+            <a:r>
+              <a:rPr lang="en-US" dirty="0" err="1"/>
+              <a:t>ui</a:t>
+            </a:r>
+            <a:r>
+              <a:rPr lang="en-US" dirty="0"/>
+              <a:t> and many other dependencies</a:t>
+            </a:r>
+          </a:p>
+          <a:p>
+            <a:endParaRPr lang="en-US" dirty="0"/>
+          </a:p>
+          <a:p>
+            <a:r>
+              <a:rPr lang="en-US" dirty="0">
+                <a:hlinkClick r:id="rId2"/>
+              </a:rPr>
+              <a:t>https://github.com/DHI/react-components/tree/master/packages/react-components</a:t>
+            </a:r>
+            <a:r>
+              <a:rPr lang="en-US" dirty="0"/>
+              <a:t> </a:t>
+            </a:r>
+          </a:p>
+        </p:txBody>
+      </p:sp>
+      <p:pic>
+        <p:nvPicPr>
+          <p:cNvPr id="5" name="Picture 4">
+            <a:extLst>
+              <a:ext uri="{FF2B5EF4-FFF2-40B4-BE49-F238E27FC236}">
+                <a16:creationId xmlns:a16="http://schemas.microsoft.com/office/drawing/2014/main" id="{30300618-E7D0-D3F2-BBA0-C53F702D40A1}"/>
+              </a:ext>
+            </a:extLst>
+          </p:cNvPr>
+          <p:cNvPicPr>
+            <a:picLocks noChangeAspect="1"/>
+          </p:cNvPicPr>
+          <p:nvPr/>
+        </p:nvPicPr>
+        <p:blipFill>
+          <a:blip r:embed="rId3"/>
+          <a:stretch>
+            <a:fillRect/>
+          </a:stretch>
+        </p:blipFill>
+        <p:spPr>
+          <a:xfrm>
+            <a:off x="1300799" y="2919307"/>
+            <a:ext cx="3864005" cy="3215125"/>
+          </a:xfrm>
+          <a:prstGeom prst="rect">
+            <a:avLst/>
+          </a:prstGeom>
+        </p:spPr>
+      </p:pic>
+      <p:pic>
+        <p:nvPicPr>
+          <p:cNvPr id="8" name="Picture 7">
+            <a:extLst>
+              <a:ext uri="{FF2B5EF4-FFF2-40B4-BE49-F238E27FC236}">
+                <a16:creationId xmlns:a16="http://schemas.microsoft.com/office/drawing/2014/main" id="{A74852F7-9730-FC14-E408-FF47B64376A0}"/>
+              </a:ext>
+            </a:extLst>
+          </p:cNvPr>
+          <p:cNvPicPr>
+            <a:picLocks noChangeAspect="1"/>
+          </p:cNvPicPr>
+          <p:nvPr/>
+        </p:nvPicPr>
+        <p:blipFill>
+          <a:blip r:embed="rId4"/>
+          <a:stretch>
+            <a:fillRect/>
+          </a:stretch>
+        </p:blipFill>
+        <p:spPr>
+          <a:xfrm>
+            <a:off x="6460552" y="3637126"/>
+            <a:ext cx="3963608" cy="1779485"/>
+          </a:xfrm>
+          <a:prstGeom prst="rect">
+            <a:avLst/>
+          </a:prstGeom>
+        </p:spPr>
+      </p:pic>
+    </p:spTree>
+    <p:extLst>
+      <p:ext uri="{BB962C8B-B14F-4D97-AF65-F5344CB8AC3E}">
+        <p14:creationId xmlns:p14="http://schemas.microsoft.com/office/powerpoint/2010/main" val="4073216413"/>
+      </p:ext>
+    </p:extLst>
+  </p:cSld>
+  <p:clrMapOvr>
+    <a:masterClrMapping/>
+  </p:clrMapOvr>
+</p:sld>
+</file>
+
 <file path=ppt/slides/slide2.xml><?xml version="1.0" encoding="utf-8"?>
 <p:sld xmlns:a="http://schemas.openxmlformats.org/drawingml/2006/main" xmlns:r="http://schemas.openxmlformats.org/officeDocument/2006/relationships" xmlns:p="http://schemas.openxmlformats.org/presentationml/2006/main">
   <p:cSld>
@@ -6261,6 +6591,544 @@
     <p:extLst>
       <p:ext uri="{BB962C8B-B14F-4D97-AF65-F5344CB8AC3E}">
         <p14:creationId xmlns:p14="http://schemas.microsoft.com/office/powerpoint/2010/main" val="2185139754"/>
+      </p:ext>
+    </p:extLst>
+  </p:cSld>
+  <p:clrMapOvr>
+    <a:masterClrMapping/>
+  </p:clrMapOvr>
+</p:sld>
+</file>
+
+<file path=ppt/slides/slide5.xml><?xml version="1.0" encoding="utf-8"?>
+<p:sld xmlns:a="http://schemas.openxmlformats.org/drawingml/2006/main" xmlns:r="http://schemas.openxmlformats.org/officeDocument/2006/relationships" xmlns:p="http://schemas.openxmlformats.org/presentationml/2006/main">
+  <p:cSld>
+    <p:spTree>
+      <p:nvGrpSpPr>
+        <p:cNvPr id="1" name=""/>
+        <p:cNvGrpSpPr/>
+        <p:nvPr/>
+      </p:nvGrpSpPr>
+      <p:grpSpPr>
+        <a:xfrm>
+          <a:off x="0" y="0"/>
+          <a:ext cx="0" cy="0"/>
+          <a:chOff x="0" y="0"/>
+          <a:chExt cx="0" cy="0"/>
+        </a:xfrm>
+      </p:grpSpPr>
+      <p:sp>
+        <p:nvSpPr>
+          <p:cNvPr id="2" name="TextBox 1">
+            <a:extLst>
+              <a:ext uri="{FF2B5EF4-FFF2-40B4-BE49-F238E27FC236}">
+                <a16:creationId xmlns:a16="http://schemas.microsoft.com/office/drawing/2014/main" id="{2F95C7AD-28A6-6FFA-F6A5-977AB6EDBB6E}"/>
+              </a:ext>
+            </a:extLst>
+          </p:cNvPr>
+          <p:cNvSpPr txBox="1"/>
+          <p:nvPr/>
+        </p:nvSpPr>
+        <p:spPr>
+          <a:xfrm>
+            <a:off x="3492242" y="3044279"/>
+            <a:ext cx="5920019" cy="769441"/>
+          </a:xfrm>
+          <a:prstGeom prst="rect">
+            <a:avLst/>
+          </a:prstGeom>
+          <a:noFill/>
+        </p:spPr>
+        <p:txBody>
+          <a:bodyPr wrap="none" rtlCol="0">
+            <a:spAutoFit/>
+          </a:bodyPr>
+          <a:lstStyle/>
+          <a:p>
+            <a:r>
+              <a:rPr lang="da-DK" sz="4400" dirty="0"/>
+              <a:t>Developing the front end</a:t>
+            </a:r>
+            <a:endParaRPr lang="en-US" sz="4400" dirty="0"/>
+          </a:p>
+        </p:txBody>
+      </p:sp>
+    </p:spTree>
+    <p:extLst>
+      <p:ext uri="{BB962C8B-B14F-4D97-AF65-F5344CB8AC3E}">
+        <p14:creationId xmlns:p14="http://schemas.microsoft.com/office/powerpoint/2010/main" val="3365791006"/>
+      </p:ext>
+    </p:extLst>
+  </p:cSld>
+  <p:clrMapOvr>
+    <a:masterClrMapping/>
+  </p:clrMapOvr>
+</p:sld>
+</file>
+
+<file path=ppt/slides/slide6.xml><?xml version="1.0" encoding="utf-8"?>
+<p:sld xmlns:a="http://schemas.openxmlformats.org/drawingml/2006/main" xmlns:r="http://schemas.openxmlformats.org/officeDocument/2006/relationships" xmlns:p="http://schemas.openxmlformats.org/presentationml/2006/main">
+  <p:cSld>
+    <p:spTree>
+      <p:nvGrpSpPr>
+        <p:cNvPr id="1" name=""/>
+        <p:cNvGrpSpPr/>
+        <p:nvPr/>
+      </p:nvGrpSpPr>
+      <p:grpSpPr>
+        <a:xfrm>
+          <a:off x="0" y="0"/>
+          <a:ext cx="0" cy="0"/>
+          <a:chOff x="0" y="0"/>
+          <a:chExt cx="0" cy="0"/>
+        </a:xfrm>
+      </p:grpSpPr>
+      <p:sp>
+        <p:nvSpPr>
+          <p:cNvPr id="2" name="TextBox 1">
+            <a:extLst>
+              <a:ext uri="{FF2B5EF4-FFF2-40B4-BE49-F238E27FC236}">
+                <a16:creationId xmlns:a16="http://schemas.microsoft.com/office/drawing/2014/main" id="{2F95C7AD-28A6-6FFA-F6A5-977AB6EDBB6E}"/>
+              </a:ext>
+            </a:extLst>
+          </p:cNvPr>
+          <p:cNvSpPr txBox="1"/>
+          <p:nvPr/>
+        </p:nvSpPr>
+        <p:spPr>
+          <a:xfrm>
+            <a:off x="3397416" y="863265"/>
+            <a:ext cx="3631700" cy="769441"/>
+          </a:xfrm>
+          <a:prstGeom prst="rect">
+            <a:avLst/>
+          </a:prstGeom>
+          <a:noFill/>
+        </p:spPr>
+        <p:txBody>
+          <a:bodyPr wrap="none" rtlCol="0">
+            <a:spAutoFit/>
+          </a:bodyPr>
+          <a:lstStyle/>
+          <a:p>
+            <a:r>
+              <a:rPr lang="da-DK" sz="4400" dirty="0"/>
+              <a:t>Init a react app</a:t>
+            </a:r>
+            <a:endParaRPr lang="en-US" sz="4400" dirty="0"/>
+          </a:p>
+        </p:txBody>
+      </p:sp>
+      <p:sp>
+        <p:nvSpPr>
+          <p:cNvPr id="4" name="TextBox 3">
+            <a:extLst>
+              <a:ext uri="{FF2B5EF4-FFF2-40B4-BE49-F238E27FC236}">
+                <a16:creationId xmlns:a16="http://schemas.microsoft.com/office/drawing/2014/main" id="{BC884E33-4A6B-CA67-82CC-620D9C4953AD}"/>
+              </a:ext>
+            </a:extLst>
+          </p:cNvPr>
+          <p:cNvSpPr txBox="1"/>
+          <p:nvPr/>
+        </p:nvSpPr>
+        <p:spPr>
+          <a:xfrm>
+            <a:off x="1219200" y="3075093"/>
+            <a:ext cx="5257721" cy="369332"/>
+          </a:xfrm>
+          <a:prstGeom prst="rect">
+            <a:avLst/>
+          </a:prstGeom>
+          <a:noFill/>
+        </p:spPr>
+        <p:txBody>
+          <a:bodyPr wrap="none" rtlCol="0">
+            <a:spAutoFit/>
+          </a:bodyPr>
+          <a:lstStyle/>
+          <a:p>
+            <a:r>
+              <a:rPr lang="en-US" dirty="0">
+                <a:hlinkClick r:id="rId2"/>
+              </a:rPr>
+              <a:t>https://create-react-app.dev/docs/adding-typescript/</a:t>
+            </a:r>
+            <a:r>
+              <a:rPr lang="en-US" dirty="0"/>
+              <a:t> </a:t>
+            </a:r>
+          </a:p>
+        </p:txBody>
+      </p:sp>
+    </p:spTree>
+    <p:extLst>
+      <p:ext uri="{BB962C8B-B14F-4D97-AF65-F5344CB8AC3E}">
+        <p14:creationId xmlns:p14="http://schemas.microsoft.com/office/powerpoint/2010/main" val="2165732782"/>
+      </p:ext>
+    </p:extLst>
+  </p:cSld>
+  <p:clrMapOvr>
+    <a:masterClrMapping/>
+  </p:clrMapOvr>
+</p:sld>
+</file>
+
+<file path=ppt/slides/slide7.xml><?xml version="1.0" encoding="utf-8"?>
+<p:sld xmlns:a="http://schemas.openxmlformats.org/drawingml/2006/main" xmlns:r="http://schemas.openxmlformats.org/officeDocument/2006/relationships" xmlns:p="http://schemas.openxmlformats.org/presentationml/2006/main">
+  <p:cSld>
+    <p:spTree>
+      <p:nvGrpSpPr>
+        <p:cNvPr id="1" name=""/>
+        <p:cNvGrpSpPr/>
+        <p:nvPr/>
+      </p:nvGrpSpPr>
+      <p:grpSpPr>
+        <a:xfrm>
+          <a:off x="0" y="0"/>
+          <a:ext cx="0" cy="0"/>
+          <a:chOff x="0" y="0"/>
+          <a:chExt cx="0" cy="0"/>
+        </a:xfrm>
+      </p:grpSpPr>
+      <p:sp>
+        <p:nvSpPr>
+          <p:cNvPr id="2" name="TextBox 1">
+            <a:extLst>
+              <a:ext uri="{FF2B5EF4-FFF2-40B4-BE49-F238E27FC236}">
+                <a16:creationId xmlns:a16="http://schemas.microsoft.com/office/drawing/2014/main" id="{2F95C7AD-28A6-6FFA-F6A5-977AB6EDBB6E}"/>
+              </a:ext>
+            </a:extLst>
+          </p:cNvPr>
+          <p:cNvSpPr txBox="1"/>
+          <p:nvPr/>
+        </p:nvSpPr>
+        <p:spPr>
+          <a:xfrm>
+            <a:off x="3397415" y="314625"/>
+            <a:ext cx="4707058" cy="769441"/>
+          </a:xfrm>
+          <a:prstGeom prst="rect">
+            <a:avLst/>
+          </a:prstGeom>
+          <a:noFill/>
+        </p:spPr>
+        <p:txBody>
+          <a:bodyPr wrap="none" rtlCol="0">
+            <a:spAutoFit/>
+          </a:bodyPr>
+          <a:lstStyle/>
+          <a:p>
+            <a:r>
+              <a:rPr lang="da-DK" sz="4400" dirty="0"/>
+              <a:t>Test the empty app</a:t>
+            </a:r>
+            <a:endParaRPr lang="en-US" sz="4400" dirty="0"/>
+          </a:p>
+        </p:txBody>
+      </p:sp>
+      <p:sp>
+        <p:nvSpPr>
+          <p:cNvPr id="4" name="TextBox 3">
+            <a:extLst>
+              <a:ext uri="{FF2B5EF4-FFF2-40B4-BE49-F238E27FC236}">
+                <a16:creationId xmlns:a16="http://schemas.microsoft.com/office/drawing/2014/main" id="{BC884E33-4A6B-CA67-82CC-620D9C4953AD}"/>
+              </a:ext>
+            </a:extLst>
+          </p:cNvPr>
+          <p:cNvSpPr txBox="1"/>
+          <p:nvPr/>
+        </p:nvSpPr>
+        <p:spPr>
+          <a:xfrm>
+            <a:off x="704426" y="1632706"/>
+            <a:ext cx="1079911" cy="369332"/>
+          </a:xfrm>
+          <a:prstGeom prst="rect">
+            <a:avLst/>
+          </a:prstGeom>
+          <a:noFill/>
+        </p:spPr>
+        <p:txBody>
+          <a:bodyPr wrap="none" rtlCol="0">
+            <a:spAutoFit/>
+          </a:bodyPr>
+          <a:lstStyle/>
+          <a:p>
+            <a:r>
+              <a:rPr lang="en-US" b="0" i="0" dirty="0">
+                <a:solidFill>
+                  <a:srgbClr val="BFC7D5"/>
+                </a:solidFill>
+                <a:effectLst/>
+                <a:latin typeface="SFMono-Regular"/>
+              </a:rPr>
+              <a:t>yarn start</a:t>
+            </a:r>
+            <a:endParaRPr lang="en-US" dirty="0"/>
+          </a:p>
+        </p:txBody>
+      </p:sp>
+      <p:pic>
+        <p:nvPicPr>
+          <p:cNvPr id="5" name="Picture 4">
+            <a:extLst>
+              <a:ext uri="{FF2B5EF4-FFF2-40B4-BE49-F238E27FC236}">
+                <a16:creationId xmlns:a16="http://schemas.microsoft.com/office/drawing/2014/main" id="{2AF5F4A3-955D-7715-DC2B-C4F6462C4483}"/>
+              </a:ext>
+            </a:extLst>
+          </p:cNvPr>
+          <p:cNvPicPr>
+            <a:picLocks noChangeAspect="1"/>
+          </p:cNvPicPr>
+          <p:nvPr/>
+        </p:nvPicPr>
+        <p:blipFill>
+          <a:blip r:embed="rId2"/>
+          <a:stretch>
+            <a:fillRect/>
+          </a:stretch>
+        </p:blipFill>
+        <p:spPr>
+          <a:xfrm>
+            <a:off x="3476997" y="1426305"/>
+            <a:ext cx="5238005" cy="4855962"/>
+          </a:xfrm>
+          <a:prstGeom prst="rect">
+            <a:avLst/>
+          </a:prstGeom>
+        </p:spPr>
+      </p:pic>
+    </p:spTree>
+    <p:extLst>
+      <p:ext uri="{BB962C8B-B14F-4D97-AF65-F5344CB8AC3E}">
+        <p14:creationId xmlns:p14="http://schemas.microsoft.com/office/powerpoint/2010/main" val="358308092"/>
+      </p:ext>
+    </p:extLst>
+  </p:cSld>
+  <p:clrMapOvr>
+    <a:masterClrMapping/>
+  </p:clrMapOvr>
+</p:sld>
+</file>
+
+<file path=ppt/slides/slide8.xml><?xml version="1.0" encoding="utf-8"?>
+<p:sld xmlns:a="http://schemas.openxmlformats.org/drawingml/2006/main" xmlns:r="http://schemas.openxmlformats.org/officeDocument/2006/relationships" xmlns:p="http://schemas.openxmlformats.org/presentationml/2006/main">
+  <p:cSld>
+    <p:spTree>
+      <p:nvGrpSpPr>
+        <p:cNvPr id="1" name=""/>
+        <p:cNvGrpSpPr/>
+        <p:nvPr/>
+      </p:nvGrpSpPr>
+      <p:grpSpPr>
+        <a:xfrm>
+          <a:off x="0" y="0"/>
+          <a:ext cx="0" cy="0"/>
+          <a:chOff x="0" y="0"/>
+          <a:chExt cx="0" cy="0"/>
+        </a:xfrm>
+      </p:grpSpPr>
+      <p:sp>
+        <p:nvSpPr>
+          <p:cNvPr id="2" name="TextBox 1">
+            <a:extLst>
+              <a:ext uri="{FF2B5EF4-FFF2-40B4-BE49-F238E27FC236}">
+                <a16:creationId xmlns:a16="http://schemas.microsoft.com/office/drawing/2014/main" id="{2F95C7AD-28A6-6FFA-F6A5-977AB6EDBB6E}"/>
+              </a:ext>
+            </a:extLst>
+          </p:cNvPr>
+          <p:cNvSpPr txBox="1"/>
+          <p:nvPr/>
+        </p:nvSpPr>
+        <p:spPr>
+          <a:xfrm>
+            <a:off x="3397415" y="314625"/>
+            <a:ext cx="5948295" cy="769441"/>
+          </a:xfrm>
+          <a:prstGeom prst="rect">
+            <a:avLst/>
+          </a:prstGeom>
+          <a:noFill/>
+        </p:spPr>
+        <p:txBody>
+          <a:bodyPr wrap="none" rtlCol="0">
+            <a:spAutoFit/>
+          </a:bodyPr>
+          <a:lstStyle/>
+          <a:p>
+            <a:r>
+              <a:rPr lang="da-DK" sz="4400" dirty="0"/>
+              <a:t>Add login and data pages</a:t>
+            </a:r>
+            <a:endParaRPr lang="en-US" sz="4400" dirty="0"/>
+          </a:p>
+        </p:txBody>
+      </p:sp>
+      <p:pic>
+        <p:nvPicPr>
+          <p:cNvPr id="8" name="Picture 7">
+            <a:extLst>
+              <a:ext uri="{FF2B5EF4-FFF2-40B4-BE49-F238E27FC236}">
+                <a16:creationId xmlns:a16="http://schemas.microsoft.com/office/drawing/2014/main" id="{F51A28EF-33E3-10BF-B7D2-75DD198EB5F9}"/>
+              </a:ext>
+            </a:extLst>
+          </p:cNvPr>
+          <p:cNvPicPr>
+            <a:picLocks noChangeAspect="1"/>
+          </p:cNvPicPr>
+          <p:nvPr/>
+        </p:nvPicPr>
+        <p:blipFill>
+          <a:blip r:embed="rId2"/>
+          <a:stretch>
+            <a:fillRect/>
+          </a:stretch>
+        </p:blipFill>
+        <p:spPr>
+          <a:xfrm>
+            <a:off x="1732941" y="2352525"/>
+            <a:ext cx="8726118" cy="2152950"/>
+          </a:xfrm>
+          <a:prstGeom prst="rect">
+            <a:avLst/>
+          </a:prstGeom>
+        </p:spPr>
+      </p:pic>
+    </p:spTree>
+    <p:extLst>
+      <p:ext uri="{BB962C8B-B14F-4D97-AF65-F5344CB8AC3E}">
+        <p14:creationId xmlns:p14="http://schemas.microsoft.com/office/powerpoint/2010/main" val="1078570717"/>
+      </p:ext>
+    </p:extLst>
+  </p:cSld>
+  <p:clrMapOvr>
+    <a:masterClrMapping/>
+  </p:clrMapOvr>
+</p:sld>
+</file>
+
+<file path=ppt/slides/slide9.xml><?xml version="1.0" encoding="utf-8"?>
+<p:sld xmlns:a="http://schemas.openxmlformats.org/drawingml/2006/main" xmlns:r="http://schemas.openxmlformats.org/officeDocument/2006/relationships" xmlns:p="http://schemas.openxmlformats.org/presentationml/2006/main">
+  <p:cSld>
+    <p:spTree>
+      <p:nvGrpSpPr>
+        <p:cNvPr id="1" name=""/>
+        <p:cNvGrpSpPr/>
+        <p:nvPr/>
+      </p:nvGrpSpPr>
+      <p:grpSpPr>
+        <a:xfrm>
+          <a:off x="0" y="0"/>
+          <a:ext cx="0" cy="0"/>
+          <a:chOff x="0" y="0"/>
+          <a:chExt cx="0" cy="0"/>
+        </a:xfrm>
+      </p:grpSpPr>
+      <p:sp>
+        <p:nvSpPr>
+          <p:cNvPr id="2" name="TextBox 1">
+            <a:extLst>
+              <a:ext uri="{FF2B5EF4-FFF2-40B4-BE49-F238E27FC236}">
+                <a16:creationId xmlns:a16="http://schemas.microsoft.com/office/drawing/2014/main" id="{2F95C7AD-28A6-6FFA-F6A5-977AB6EDBB6E}"/>
+              </a:ext>
+            </a:extLst>
+          </p:cNvPr>
+          <p:cNvSpPr txBox="1"/>
+          <p:nvPr/>
+        </p:nvSpPr>
+        <p:spPr>
+          <a:xfrm>
+            <a:off x="3397415" y="314625"/>
+            <a:ext cx="4182812" cy="769441"/>
+          </a:xfrm>
+          <a:prstGeom prst="rect">
+            <a:avLst/>
+          </a:prstGeom>
+          <a:noFill/>
+        </p:spPr>
+        <p:txBody>
+          <a:bodyPr wrap="none" rtlCol="0">
+            <a:spAutoFit/>
+          </a:bodyPr>
+          <a:lstStyle/>
+          <a:p>
+            <a:r>
+              <a:rPr lang="da-DK" sz="4400" dirty="0"/>
+              <a:t>Add state storage</a:t>
+            </a:r>
+            <a:endParaRPr lang="en-US" sz="4400" dirty="0"/>
+          </a:p>
+        </p:txBody>
+      </p:sp>
+      <p:sp>
+        <p:nvSpPr>
+          <p:cNvPr id="3" name="TextBox 2">
+            <a:extLst>
+              <a:ext uri="{FF2B5EF4-FFF2-40B4-BE49-F238E27FC236}">
+                <a16:creationId xmlns:a16="http://schemas.microsoft.com/office/drawing/2014/main" id="{C58B6763-E146-6C0C-77B8-4D4745DBD649}"/>
+              </a:ext>
+            </a:extLst>
+          </p:cNvPr>
+          <p:cNvSpPr txBox="1"/>
+          <p:nvPr/>
+        </p:nvSpPr>
+        <p:spPr>
+          <a:xfrm>
+            <a:off x="636693" y="1625600"/>
+            <a:ext cx="4473725" cy="369332"/>
+          </a:xfrm>
+          <a:prstGeom prst="rect">
+            <a:avLst/>
+          </a:prstGeom>
+          <a:noFill/>
+        </p:spPr>
+        <p:txBody>
+          <a:bodyPr wrap="none" rtlCol="0">
+            <a:spAutoFit/>
+          </a:bodyPr>
+          <a:lstStyle/>
+          <a:p>
+            <a:r>
+              <a:rPr lang="en-US" dirty="0"/>
+              <a:t>https://mobx.js.org/defining-data-stores.html</a:t>
+            </a:r>
+          </a:p>
+        </p:txBody>
+      </p:sp>
+      <p:pic>
+        <p:nvPicPr>
+          <p:cNvPr id="5" name="Picture 4">
+            <a:extLst>
+              <a:ext uri="{FF2B5EF4-FFF2-40B4-BE49-F238E27FC236}">
+                <a16:creationId xmlns:a16="http://schemas.microsoft.com/office/drawing/2014/main" id="{B5AB8A7D-CA8D-35C8-B605-C369C07C4A09}"/>
+              </a:ext>
+            </a:extLst>
+          </p:cNvPr>
+          <p:cNvPicPr>
+            <a:picLocks noChangeAspect="1"/>
+          </p:cNvPicPr>
+          <p:nvPr/>
+        </p:nvPicPr>
+        <p:blipFill>
+          <a:blip r:embed="rId2"/>
+          <a:stretch>
+            <a:fillRect/>
+          </a:stretch>
+        </p:blipFill>
+        <p:spPr>
+          <a:xfrm>
+            <a:off x="3842975" y="2323254"/>
+            <a:ext cx="4506050" cy="4076606"/>
+          </a:xfrm>
+          <a:prstGeom prst="rect">
+            <a:avLst/>
+          </a:prstGeom>
+        </p:spPr>
+      </p:pic>
+    </p:spTree>
+    <p:extLst>
+      <p:ext uri="{BB962C8B-B14F-4D97-AF65-F5344CB8AC3E}">
+        <p14:creationId xmlns:p14="http://schemas.microsoft.com/office/powerpoint/2010/main" val="4232163247"/>
       </p:ext>
     </p:extLst>
   </p:cSld>

</xml_diff>

<commit_message>
pp progress and frontend show version
</commit_message>
<xml_diff>
--- a/Presentations/DS-course-4-frontend.pptx
+++ b/Presentations/DS-course-4-frontend.pptx
@@ -221,7 +221,7 @@
           <a:p>
             <a:fld id="{16B0145C-99AC-4644-A36E-A4ECBC555925}" type="datetimeFigureOut">
               <a:rPr lang="en-US" smtClean="0"/>
-              <a:t>8/31/2022</a:t>
+              <a:t>9/7/2022</a:t>
             </a:fld>
             <a:endParaRPr lang="en-US"/>
           </a:p>
@@ -620,16 +620,34 @@
           <a:lstStyle/>
           <a:p>
             <a:r>
+              <a:rPr lang="en-US" dirty="0" err="1"/>
+              <a:t>Github</a:t>
+            </a:r>
+            <a:r>
               <a:rPr lang="en-US" dirty="0"/>
-              <a:t>Additional points can be added simply by updating the </a:t>
-            </a:r>
+              <a:t> token for installing DHI/react-components</a:t>
+            </a:r>
+          </a:p>
+          <a:p>
             <a:r>
               <a:rPr lang="en-US" dirty="0" err="1"/>
-              <a:t>points.geojson</a:t>
+              <a:t>Mapbox</a:t>
             </a:r>
             <a:r>
               <a:rPr lang="en-US" dirty="0"/>
-              <a:t> file</a:t>
+              <a:t> token for using both react-map-</a:t>
+            </a:r>
+            <a:r>
+              <a:rPr lang="en-US" dirty="0" err="1"/>
+              <a:t>gl</a:t>
+            </a:r>
+            <a:r>
+              <a:rPr lang="en-US" dirty="0"/>
+              <a:t> component and showing </a:t>
+            </a:r>
+            <a:r>
+              <a:rPr lang="en-US"/>
+              <a:t>vector tiles</a:t>
             </a:r>
           </a:p>
         </p:txBody>
@@ -651,7 +669,7 @@
           <a:p>
             <a:fld id="{A6E96146-6681-4DBF-B085-F659EAF9A4FE}" type="slidenum">
               <a:rPr lang="en-US" smtClean="0"/>
-              <a:t>20</a:t>
+              <a:t>17</a:t>
             </a:fld>
             <a:endParaRPr lang="en-US"/>
           </a:p>
@@ -660,7 +678,7 @@
     </p:spTree>
     <p:extLst>
       <p:ext uri="{BB962C8B-B14F-4D97-AF65-F5344CB8AC3E}">
-        <p14:creationId xmlns:p14="http://schemas.microsoft.com/office/powerpoint/2010/main" val="1971807371"/>
+        <p14:creationId xmlns:p14="http://schemas.microsoft.com/office/powerpoint/2010/main" val="854545794"/>
       </p:ext>
     </p:extLst>
   </p:cSld>
@@ -716,15 +734,7 @@
           <a:p>
             <a:r>
               <a:rPr lang="en-US" dirty="0"/>
-              <a:t>You can set the initial bounding box when initializing the </a:t>
-            </a:r>
-            <a:r>
-              <a:rPr lang="en-US" dirty="0" err="1"/>
-              <a:t>viewState</a:t>
-            </a:r>
-            <a:r>
-              <a:rPr lang="en-US" dirty="0"/>
-              <a:t> variable. Other approaches could include calculating the bounding box of all points once they are received (you would also need to change how the </a:t>
+              <a:t>Additional points can be added simply by updating the </a:t>
             </a:r>
             <a:r>
               <a:rPr lang="en-US" dirty="0" err="1"/>
@@ -732,7 +742,7 @@
             </a:r>
             <a:r>
               <a:rPr lang="en-US" dirty="0"/>
-              <a:t> file is fetched in order to do this)</a:t>
+              <a:t> file</a:t>
             </a:r>
           </a:p>
         </p:txBody>
@@ -754,7 +764,7 @@
           <a:p>
             <a:fld id="{A6E96146-6681-4DBF-B085-F659EAF9A4FE}" type="slidenum">
               <a:rPr lang="en-US" smtClean="0"/>
-              <a:t>21</a:t>
+              <a:t>20</a:t>
             </a:fld>
             <a:endParaRPr lang="en-US"/>
           </a:p>
@@ -763,7 +773,7 @@
     </p:spTree>
     <p:extLst>
       <p:ext uri="{BB962C8B-B14F-4D97-AF65-F5344CB8AC3E}">
-        <p14:creationId xmlns:p14="http://schemas.microsoft.com/office/powerpoint/2010/main" val="3198728267"/>
+        <p14:creationId xmlns:p14="http://schemas.microsoft.com/office/powerpoint/2010/main" val="1971807371"/>
       </p:ext>
     </p:extLst>
   </p:cSld>
@@ -819,7 +829,23 @@
           <a:p>
             <a:r>
               <a:rPr lang="en-US" dirty="0"/>
-              <a:t>The layout/position of the Data page components are controlled by JSS. Update the JSS so that the sidebar becomes a bottom bar.</a:t>
+              <a:t>You can set the initial bounding box when initializing the </a:t>
+            </a:r>
+            <a:r>
+              <a:rPr lang="en-US" dirty="0" err="1"/>
+              <a:t>viewState</a:t>
+            </a:r>
+            <a:r>
+              <a:rPr lang="en-US" dirty="0"/>
+              <a:t> variable. Other approaches could include calculating the bounding box of all points once they are received (you would also need to change how the </a:t>
+            </a:r>
+            <a:r>
+              <a:rPr lang="en-US" dirty="0" err="1"/>
+              <a:t>points.geojson</a:t>
+            </a:r>
+            <a:r>
+              <a:rPr lang="en-US" dirty="0"/>
+              <a:t> file is fetched in order to do this)</a:t>
             </a:r>
           </a:p>
         </p:txBody>
@@ -841,7 +867,7 @@
           <a:p>
             <a:fld id="{A6E96146-6681-4DBF-B085-F659EAF9A4FE}" type="slidenum">
               <a:rPr lang="en-US" smtClean="0"/>
-              <a:t>22</a:t>
+              <a:t>21</a:t>
             </a:fld>
             <a:endParaRPr lang="en-US"/>
           </a:p>
@@ -850,7 +876,7 @@
     </p:spTree>
     <p:extLst>
       <p:ext uri="{BB962C8B-B14F-4D97-AF65-F5344CB8AC3E}">
-        <p14:creationId xmlns:p14="http://schemas.microsoft.com/office/powerpoint/2010/main" val="3309120125"/>
+        <p14:creationId xmlns:p14="http://schemas.microsoft.com/office/powerpoint/2010/main" val="3198728267"/>
       </p:ext>
     </p:extLst>
   </p:cSld>
@@ -906,7 +932,7 @@
           <a:p>
             <a:r>
               <a:rPr lang="en-US" dirty="0"/>
-              <a:t>Find the code for the ‘Log Out’ button in this app, and use that as a basis for a new button in the sidebar, that clears the selected point app state.</a:t>
+              <a:t>The layout/position of the Data page components are controlled by JSS. Update the JSS so that the sidebar becomes a bottom bar.</a:t>
             </a:r>
           </a:p>
         </p:txBody>
@@ -928,7 +954,7 @@
           <a:p>
             <a:fld id="{A6E96146-6681-4DBF-B085-F659EAF9A4FE}" type="slidenum">
               <a:rPr lang="en-US" smtClean="0"/>
-              <a:t>23</a:t>
+              <a:t>22</a:t>
             </a:fld>
             <a:endParaRPr lang="en-US"/>
           </a:p>
@@ -937,7 +963,7 @@
     </p:spTree>
     <p:extLst>
       <p:ext uri="{BB962C8B-B14F-4D97-AF65-F5344CB8AC3E}">
-        <p14:creationId xmlns:p14="http://schemas.microsoft.com/office/powerpoint/2010/main" val="2078125574"/>
+        <p14:creationId xmlns:p14="http://schemas.microsoft.com/office/powerpoint/2010/main" val="3309120125"/>
       </p:ext>
     </p:extLst>
   </p:cSld>
@@ -992,6 +1018,93 @@
           <a:lstStyle/>
           <a:p>
             <a:r>
+              <a:rPr lang="en-US" dirty="0"/>
+              <a:t>Find the code for the ‘Log Out’ button in this app, and use that as a basis for a new button in the sidebar, that clears the selected point app state.</a:t>
+            </a:r>
+          </a:p>
+        </p:txBody>
+      </p:sp>
+      <p:sp>
+        <p:nvSpPr>
+          <p:cNvPr id="4" name="Slide Number Placeholder 3"/>
+          <p:cNvSpPr>
+            <a:spLocks noGrp="1"/>
+          </p:cNvSpPr>
+          <p:nvPr>
+            <p:ph type="sldNum" sz="quarter" idx="5"/>
+          </p:nvPr>
+        </p:nvSpPr>
+        <p:spPr/>
+        <p:txBody>
+          <a:bodyPr/>
+          <a:lstStyle/>
+          <a:p>
+            <a:fld id="{A6E96146-6681-4DBF-B085-F659EAF9A4FE}" type="slidenum">
+              <a:rPr lang="en-US" smtClean="0"/>
+              <a:t>23</a:t>
+            </a:fld>
+            <a:endParaRPr lang="en-US"/>
+          </a:p>
+        </p:txBody>
+      </p:sp>
+    </p:spTree>
+    <p:extLst>
+      <p:ext uri="{BB962C8B-B14F-4D97-AF65-F5344CB8AC3E}">
+        <p14:creationId xmlns:p14="http://schemas.microsoft.com/office/powerpoint/2010/main" val="2078125574"/>
+      </p:ext>
+    </p:extLst>
+  </p:cSld>
+  <p:clrMapOvr>
+    <a:masterClrMapping/>
+  </p:clrMapOvr>
+</p:notes>
+</file>
+
+<file path=ppt/notesSlides/notesSlide15.xml><?xml version="1.0" encoding="utf-8"?>
+<p:notes xmlns:a="http://schemas.openxmlformats.org/drawingml/2006/main" xmlns:r="http://schemas.openxmlformats.org/officeDocument/2006/relationships" xmlns:p="http://schemas.openxmlformats.org/presentationml/2006/main">
+  <p:cSld>
+    <p:spTree>
+      <p:nvGrpSpPr>
+        <p:cNvPr id="1" name=""/>
+        <p:cNvGrpSpPr/>
+        <p:nvPr/>
+      </p:nvGrpSpPr>
+      <p:grpSpPr>
+        <a:xfrm>
+          <a:off x="0" y="0"/>
+          <a:ext cx="0" cy="0"/>
+          <a:chOff x="0" y="0"/>
+          <a:chExt cx="0" cy="0"/>
+        </a:xfrm>
+      </p:grpSpPr>
+      <p:sp>
+        <p:nvSpPr>
+          <p:cNvPr id="2" name="Slide Image Placeholder 1"/>
+          <p:cNvSpPr>
+            <a:spLocks noGrp="1" noRot="1" noChangeAspect="1"/>
+          </p:cNvSpPr>
+          <p:nvPr>
+            <p:ph type="sldImg"/>
+          </p:nvPr>
+        </p:nvSpPr>
+        <p:spPr/>
+      </p:sp>
+      <p:sp>
+        <p:nvSpPr>
+          <p:cNvPr id="3" name="Notes Placeholder 2"/>
+          <p:cNvSpPr>
+            <a:spLocks noGrp="1"/>
+          </p:cNvSpPr>
+          <p:nvPr>
+            <p:ph type="body" idx="1"/>
+          </p:nvPr>
+        </p:nvSpPr>
+        <p:spPr/>
+        <p:txBody>
+          <a:bodyPr/>
+          <a:lstStyle/>
+          <a:p>
+            <a:r>
               <a:rPr lang="en-US" noProof="0" dirty="0"/>
               <a:t>Wrap Up. Before next live session (a week from now)</a:t>
             </a:r>
@@ -1059,7 +1172,7 @@
 </p:notes>
 </file>
 
-<file path=ppt/notesSlides/notesSlide15.xml><?xml version="1.0" encoding="utf-8"?>
+<file path=ppt/notesSlides/notesSlide16.xml><?xml version="1.0" encoding="utf-8"?>
 <p:notes xmlns:a="http://schemas.openxmlformats.org/drawingml/2006/main" xmlns:r="http://schemas.openxmlformats.org/officeDocument/2006/relationships" xmlns:p="http://schemas.openxmlformats.org/presentationml/2006/main">
   <p:cSld>
     <p:spTree>
@@ -2336,7 +2449,7 @@
           <a:p>
             <a:fld id="{973BC00D-352D-4681-8132-8CC5EB9D512D}" type="datetimeFigureOut">
               <a:rPr lang="en-US" smtClean="0"/>
-              <a:t>8/31/2022</a:t>
+              <a:t>9/7/2022</a:t>
             </a:fld>
             <a:endParaRPr lang="en-US"/>
           </a:p>
@@ -2534,7 +2647,7 @@
           <a:p>
             <a:fld id="{973BC00D-352D-4681-8132-8CC5EB9D512D}" type="datetimeFigureOut">
               <a:rPr lang="en-US" smtClean="0"/>
-              <a:t>8/31/2022</a:t>
+              <a:t>9/7/2022</a:t>
             </a:fld>
             <a:endParaRPr lang="en-US"/>
           </a:p>
@@ -2742,7 +2855,7 @@
           <a:p>
             <a:fld id="{973BC00D-352D-4681-8132-8CC5EB9D512D}" type="datetimeFigureOut">
               <a:rPr lang="en-US" smtClean="0"/>
-              <a:t>8/31/2022</a:t>
+              <a:t>9/7/2022</a:t>
             </a:fld>
             <a:endParaRPr lang="en-US"/>
           </a:p>
@@ -2940,7 +3053,7 @@
           <a:p>
             <a:fld id="{973BC00D-352D-4681-8132-8CC5EB9D512D}" type="datetimeFigureOut">
               <a:rPr lang="en-US" smtClean="0"/>
-              <a:t>8/31/2022</a:t>
+              <a:t>9/7/2022</a:t>
             </a:fld>
             <a:endParaRPr lang="en-US"/>
           </a:p>
@@ -3215,7 +3328,7 @@
           <a:p>
             <a:fld id="{973BC00D-352D-4681-8132-8CC5EB9D512D}" type="datetimeFigureOut">
               <a:rPr lang="en-US" smtClean="0"/>
-              <a:t>8/31/2022</a:t>
+              <a:t>9/7/2022</a:t>
             </a:fld>
             <a:endParaRPr lang="en-US"/>
           </a:p>
@@ -3480,7 +3593,7 @@
           <a:p>
             <a:fld id="{973BC00D-352D-4681-8132-8CC5EB9D512D}" type="datetimeFigureOut">
               <a:rPr lang="en-US" smtClean="0"/>
-              <a:t>8/31/2022</a:t>
+              <a:t>9/7/2022</a:t>
             </a:fld>
             <a:endParaRPr lang="en-US"/>
           </a:p>
@@ -3892,7 +4005,7 @@
           <a:p>
             <a:fld id="{973BC00D-352D-4681-8132-8CC5EB9D512D}" type="datetimeFigureOut">
               <a:rPr lang="en-US" smtClean="0"/>
-              <a:t>8/31/2022</a:t>
+              <a:t>9/7/2022</a:t>
             </a:fld>
             <a:endParaRPr lang="en-US"/>
           </a:p>
@@ -4033,7 +4146,7 @@
           <a:p>
             <a:fld id="{973BC00D-352D-4681-8132-8CC5EB9D512D}" type="datetimeFigureOut">
               <a:rPr lang="en-US" smtClean="0"/>
-              <a:t>8/31/2022</a:t>
+              <a:t>9/7/2022</a:t>
             </a:fld>
             <a:endParaRPr lang="en-US"/>
           </a:p>
@@ -4146,7 +4259,7 @@
           <a:p>
             <a:fld id="{973BC00D-352D-4681-8132-8CC5EB9D512D}" type="datetimeFigureOut">
               <a:rPr lang="en-US" smtClean="0"/>
-              <a:t>8/31/2022</a:t>
+              <a:t>9/7/2022</a:t>
             </a:fld>
             <a:endParaRPr lang="en-US"/>
           </a:p>
@@ -4457,7 +4570,7 @@
           <a:p>
             <a:fld id="{973BC00D-352D-4681-8132-8CC5EB9D512D}" type="datetimeFigureOut">
               <a:rPr lang="en-US" smtClean="0"/>
-              <a:t>8/31/2022</a:t>
+              <a:t>9/7/2022</a:t>
             </a:fld>
             <a:endParaRPr lang="en-US"/>
           </a:p>
@@ -4745,7 +4858,7 @@
           <a:p>
             <a:fld id="{973BC00D-352D-4681-8132-8CC5EB9D512D}" type="datetimeFigureOut">
               <a:rPr lang="en-US" smtClean="0"/>
-              <a:t>8/31/2022</a:t>
+              <a:t>9/7/2022</a:t>
             </a:fld>
             <a:endParaRPr lang="en-US"/>
           </a:p>
@@ -4986,7 +5099,7 @@
           <a:p>
             <a:fld id="{973BC00D-352D-4681-8132-8CC5EB9D512D}" type="datetimeFigureOut">
               <a:rPr lang="en-US" smtClean="0"/>
-              <a:t>8/31/2022</a:t>
+              <a:t>9/7/2022</a:t>
             </a:fld>
             <a:endParaRPr lang="en-US"/>
           </a:p>
@@ -6848,7 +6961,7 @@
             </a:r>
             <a:r>
               <a:rPr lang="da-DK" sz="2800" dirty="0">
-                <a:hlinkClick r:id="rId2"/>
+                <a:hlinkClick r:id="rId3"/>
               </a:rPr>
               <a:t>https://github.com/DHI/react-components/blob/master/packages/react-components/README.md</a:t>
             </a:r>
@@ -6868,7 +6981,7 @@
             </a:r>
             <a:r>
               <a:rPr lang="da-DK" sz="2800" dirty="0">
-                <a:hlinkClick r:id="rId3"/>
+                <a:hlinkClick r:id="rId4"/>
               </a:rPr>
               <a:t>https://account.mapbox.com/access-tokens/</a:t>
             </a:r>

</xml_diff>

<commit_message>
pp and package updates
</commit_message>
<xml_diff>
--- a/Presentations/DS-course-4-frontend.pptx
+++ b/Presentations/DS-course-4-frontend.pptx
@@ -5,7 +5,7 @@
     <p:sldMasterId id="2147483648" r:id="rId1"/>
   </p:sldMasterIdLst>
   <p:notesMasterIdLst>
-    <p:notesMasterId r:id="rId27"/>
+    <p:notesMasterId r:id="rId26"/>
   </p:notesMasterIdLst>
   <p:sldIdLst>
     <p:sldId id="257" r:id="rId2"/>
@@ -32,7 +32,6 @@
     <p:sldId id="404" r:id="rId23"/>
     <p:sldId id="405" r:id="rId24"/>
     <p:sldId id="360" r:id="rId25"/>
-    <p:sldId id="372" r:id="rId26"/>
   </p:sldIdLst>
   <p:sldSz cx="12192000" cy="6858000"/>
   <p:notesSz cx="6858000" cy="9144000"/>
@@ -221,7 +220,7 @@
           <a:p>
             <a:fld id="{16B0145C-99AC-4644-A36E-A4ECBC555925}" type="datetimeFigureOut">
               <a:rPr lang="en-US" smtClean="0"/>
-              <a:t>9/8/2022</a:t>
+              <a:t>9/9/2022</a:t>
             </a:fld>
             <a:endParaRPr lang="en-US"/>
           </a:p>
@@ -741,18 +740,7 @@
           <a:bodyPr/>
           <a:lstStyle/>
           <a:p>
-            <a:r>
-              <a:rPr lang="en-US" dirty="0"/>
-              <a:t>Additional points can be added simply by updating the </a:t>
-            </a:r>
-            <a:r>
-              <a:rPr lang="en-US" dirty="0" err="1"/>
-              <a:t>points.geojson</a:t>
-            </a:r>
-            <a:r>
-              <a:rPr lang="en-US" dirty="0"/>
-              <a:t> file</a:t>
-            </a:r>
+            <a:endParaRPr lang="en-US" dirty="0"/>
           </a:p>
         </p:txBody>
       </p:sp>
@@ -773,7 +761,7 @@
           <a:p>
             <a:fld id="{A6E96146-6681-4DBF-B085-F659EAF9A4FE}" type="slidenum">
               <a:rPr lang="en-US" smtClean="0"/>
-              <a:t>20</a:t>
+              <a:t>18</a:t>
             </a:fld>
             <a:endParaRPr lang="en-US"/>
           </a:p>
@@ -782,7 +770,7 @@
     </p:spTree>
     <p:extLst>
       <p:ext uri="{BB962C8B-B14F-4D97-AF65-F5344CB8AC3E}">
-        <p14:creationId xmlns:p14="http://schemas.microsoft.com/office/powerpoint/2010/main" val="1971807371"/>
+        <p14:creationId xmlns:p14="http://schemas.microsoft.com/office/powerpoint/2010/main" val="3672985893"/>
       </p:ext>
     </p:extLst>
   </p:cSld>
@@ -838,15 +826,7 @@
           <a:p>
             <a:r>
               <a:rPr lang="en-US" dirty="0"/>
-              <a:t>You can set the initial bounding box when initializing the </a:t>
-            </a:r>
-            <a:r>
-              <a:rPr lang="en-US" dirty="0" err="1"/>
-              <a:t>viewState</a:t>
-            </a:r>
-            <a:r>
-              <a:rPr lang="en-US" dirty="0"/>
-              <a:t> variable. Other approaches could include calculating the bounding box of all points once they are received (you would also need to change how the </a:t>
+              <a:t>Additional points can be added simply by updating the </a:t>
             </a:r>
             <a:r>
               <a:rPr lang="en-US" dirty="0" err="1"/>
@@ -854,7 +834,7 @@
             </a:r>
             <a:r>
               <a:rPr lang="en-US" dirty="0"/>
-              <a:t> file is fetched in order to do this)</a:t>
+              <a:t> file</a:t>
             </a:r>
           </a:p>
         </p:txBody>
@@ -876,7 +856,7 @@
           <a:p>
             <a:fld id="{A6E96146-6681-4DBF-B085-F659EAF9A4FE}" type="slidenum">
               <a:rPr lang="en-US" smtClean="0"/>
-              <a:t>21</a:t>
+              <a:t>20</a:t>
             </a:fld>
             <a:endParaRPr lang="en-US"/>
           </a:p>
@@ -885,7 +865,7 @@
     </p:spTree>
     <p:extLst>
       <p:ext uri="{BB962C8B-B14F-4D97-AF65-F5344CB8AC3E}">
-        <p14:creationId xmlns:p14="http://schemas.microsoft.com/office/powerpoint/2010/main" val="3198728267"/>
+        <p14:creationId xmlns:p14="http://schemas.microsoft.com/office/powerpoint/2010/main" val="1971807371"/>
       </p:ext>
     </p:extLst>
   </p:cSld>
@@ -941,7 +921,23 @@
           <a:p>
             <a:r>
               <a:rPr lang="en-US" dirty="0"/>
-              <a:t>The layout/position of the Data page components are controlled by JSS. Update the JSS so that the sidebar becomes a bottom bar.</a:t>
+              <a:t>You can set the initial bounding box when initializing the </a:t>
+            </a:r>
+            <a:r>
+              <a:rPr lang="en-US" dirty="0" err="1"/>
+              <a:t>viewState</a:t>
+            </a:r>
+            <a:r>
+              <a:rPr lang="en-US" dirty="0"/>
+              <a:t> variable. Other approaches could include calculating the bounding box of all points once they are received (you would also need to change how the </a:t>
+            </a:r>
+            <a:r>
+              <a:rPr lang="en-US" dirty="0" err="1"/>
+              <a:t>points.geojson</a:t>
+            </a:r>
+            <a:r>
+              <a:rPr lang="en-US" dirty="0"/>
+              <a:t> file is fetched in order to do this)</a:t>
             </a:r>
           </a:p>
         </p:txBody>
@@ -963,7 +959,7 @@
           <a:p>
             <a:fld id="{A6E96146-6681-4DBF-B085-F659EAF9A4FE}" type="slidenum">
               <a:rPr lang="en-US" smtClean="0"/>
-              <a:t>22</a:t>
+              <a:t>21</a:t>
             </a:fld>
             <a:endParaRPr lang="en-US"/>
           </a:p>
@@ -972,7 +968,7 @@
     </p:spTree>
     <p:extLst>
       <p:ext uri="{BB962C8B-B14F-4D97-AF65-F5344CB8AC3E}">
-        <p14:creationId xmlns:p14="http://schemas.microsoft.com/office/powerpoint/2010/main" val="3309120125"/>
+        <p14:creationId xmlns:p14="http://schemas.microsoft.com/office/powerpoint/2010/main" val="3198728267"/>
       </p:ext>
     </p:extLst>
   </p:cSld>
@@ -1028,7 +1024,7 @@
           <a:p>
             <a:r>
               <a:rPr lang="en-US" dirty="0"/>
-              <a:t>Find the code for the ‘Log Out’ button in this app, and use that as a basis for a new button in the sidebar, that clears the selected point app state.</a:t>
+              <a:t>The layout/position of the Data page components are controlled by JSS. Update the JSS so that the sidebar becomes a bottom bar.</a:t>
             </a:r>
           </a:p>
         </p:txBody>
@@ -1050,7 +1046,7 @@
           <a:p>
             <a:fld id="{A6E96146-6681-4DBF-B085-F659EAF9A4FE}" type="slidenum">
               <a:rPr lang="en-US" smtClean="0"/>
-              <a:t>23</a:t>
+              <a:t>22</a:t>
             </a:fld>
             <a:endParaRPr lang="en-US"/>
           </a:p>
@@ -1059,7 +1055,7 @@
     </p:spTree>
     <p:extLst>
       <p:ext uri="{BB962C8B-B14F-4D97-AF65-F5344CB8AC3E}">
-        <p14:creationId xmlns:p14="http://schemas.microsoft.com/office/powerpoint/2010/main" val="2078125574"/>
+        <p14:creationId xmlns:p14="http://schemas.microsoft.com/office/powerpoint/2010/main" val="3309120125"/>
       </p:ext>
     </p:extLst>
   </p:cSld>
@@ -1114,34 +1110,9 @@
           <a:lstStyle/>
           <a:p>
             <a:r>
-              <a:rPr lang="en-US" noProof="0" dirty="0"/>
-              <a:t>Wrap Up. Before next live session (a week from now)</a:t>
-            </a:r>
-          </a:p>
-          <a:p>
-            <a:endParaRPr lang="en-US" noProof="0" dirty="0"/>
-          </a:p>
-          <a:p>
-            <a:r>
-              <a:rPr lang="en-US" noProof="0" dirty="0"/>
-              <a:t>Go to the Campus site. Under module 5 you will find:</a:t>
-            </a:r>
-          </a:p>
-          <a:p>
-            <a:endParaRPr lang="en-US" noProof="0" dirty="0"/>
-          </a:p>
-          <a:p>
-            <a:pPr marL="171450" indent="-171450">
-              <a:buFont typeface="Arial" panose="020B0604020202020204" pitchFamily="34" charset="0"/>
-              <a:buChar char="•"/>
-            </a:pPr>
-            <a:r>
-              <a:rPr lang="en-US" noProof="0" dirty="0"/>
-              <a:t>Provide feedback </a:t>
-            </a:r>
-          </a:p>
-          <a:p>
-            <a:endParaRPr lang="en-US" dirty="0"/>
+              <a:rPr lang="en-US" dirty="0"/>
+              <a:t>Find the code for the ‘Log Out’ button in this app, and use that as a basis for a new button in the sidebar, that clears the selected point app state.</a:t>
+            </a:r>
           </a:p>
         </p:txBody>
       </p:sp>
@@ -1160,9 +1131,9 @@
           <a:bodyPr/>
           <a:lstStyle/>
           <a:p>
-            <a:fld id="{63C35790-097B-4F4A-AC65-68906F1196B8}" type="slidenum">
+            <a:fld id="{A6E96146-6681-4DBF-B085-F659EAF9A4FE}" type="slidenum">
               <a:rPr lang="en-US" smtClean="0"/>
-              <a:t>24</a:t>
+              <a:t>23</a:t>
             </a:fld>
             <a:endParaRPr lang="en-US"/>
           </a:p>
@@ -1171,7 +1142,7 @@
     </p:spTree>
     <p:extLst>
       <p:ext uri="{BB962C8B-B14F-4D97-AF65-F5344CB8AC3E}">
-        <p14:creationId xmlns:p14="http://schemas.microsoft.com/office/powerpoint/2010/main" val="3967404615"/>
+        <p14:creationId xmlns:p14="http://schemas.microsoft.com/office/powerpoint/2010/main" val="2078125574"/>
       </p:ext>
     </p:extLst>
   </p:cSld>
@@ -1227,8 +1198,24 @@
           <a:p>
             <a:r>
               <a:rPr lang="en-US" noProof="0" dirty="0"/>
-              <a:t>&lt;use this slide for breaks&gt;</a:t>
-            </a:r>
+              <a:t>Q/A</a:t>
+            </a:r>
+          </a:p>
+          <a:p>
+            <a:endParaRPr lang="en-US" noProof="0"/>
+          </a:p>
+          <a:p>
+            <a:r>
+              <a:rPr lang="en-US" noProof="0"/>
+              <a:t>Next </a:t>
+            </a:r>
+            <a:r>
+              <a:rPr lang="en-US" noProof="0" dirty="0"/>
+              <a:t>is the deployment module</a:t>
+            </a:r>
+          </a:p>
+          <a:p>
+            <a:endParaRPr lang="en-US" dirty="0"/>
           </a:p>
         </p:txBody>
       </p:sp>
@@ -1249,7 +1236,7 @@
           <a:p>
             <a:fld id="{63C35790-097B-4F4A-AC65-68906F1196B8}" type="slidenum">
               <a:rPr lang="en-US" smtClean="0"/>
-              <a:t>25</a:t>
+              <a:t>24</a:t>
             </a:fld>
             <a:endParaRPr lang="en-US"/>
           </a:p>
@@ -1258,7 +1245,7 @@
     </p:spTree>
     <p:extLst>
       <p:ext uri="{BB962C8B-B14F-4D97-AF65-F5344CB8AC3E}">
-        <p14:creationId xmlns:p14="http://schemas.microsoft.com/office/powerpoint/2010/main" val="1321608382"/>
+        <p14:creationId xmlns:p14="http://schemas.microsoft.com/office/powerpoint/2010/main" val="3967404615"/>
       </p:ext>
     </p:extLst>
   </p:cSld>
@@ -2458,7 +2445,7 @@
           <a:p>
             <a:fld id="{973BC00D-352D-4681-8132-8CC5EB9D512D}" type="datetimeFigureOut">
               <a:rPr lang="en-US" smtClean="0"/>
-              <a:t>9/8/2022</a:t>
+              <a:t>9/9/2022</a:t>
             </a:fld>
             <a:endParaRPr lang="en-US"/>
           </a:p>
@@ -2656,7 +2643,7 @@
           <a:p>
             <a:fld id="{973BC00D-352D-4681-8132-8CC5EB9D512D}" type="datetimeFigureOut">
               <a:rPr lang="en-US" smtClean="0"/>
-              <a:t>9/8/2022</a:t>
+              <a:t>9/9/2022</a:t>
             </a:fld>
             <a:endParaRPr lang="en-US"/>
           </a:p>
@@ -2864,7 +2851,7 @@
           <a:p>
             <a:fld id="{973BC00D-352D-4681-8132-8CC5EB9D512D}" type="datetimeFigureOut">
               <a:rPr lang="en-US" smtClean="0"/>
-              <a:t>9/8/2022</a:t>
+              <a:t>9/9/2022</a:t>
             </a:fld>
             <a:endParaRPr lang="en-US"/>
           </a:p>
@@ -3062,7 +3049,7 @@
           <a:p>
             <a:fld id="{973BC00D-352D-4681-8132-8CC5EB9D512D}" type="datetimeFigureOut">
               <a:rPr lang="en-US" smtClean="0"/>
-              <a:t>9/8/2022</a:t>
+              <a:t>9/9/2022</a:t>
             </a:fld>
             <a:endParaRPr lang="en-US"/>
           </a:p>
@@ -3337,7 +3324,7 @@
           <a:p>
             <a:fld id="{973BC00D-352D-4681-8132-8CC5EB9D512D}" type="datetimeFigureOut">
               <a:rPr lang="en-US" smtClean="0"/>
-              <a:t>9/8/2022</a:t>
+              <a:t>9/9/2022</a:t>
             </a:fld>
             <a:endParaRPr lang="en-US"/>
           </a:p>
@@ -3602,7 +3589,7 @@
           <a:p>
             <a:fld id="{973BC00D-352D-4681-8132-8CC5EB9D512D}" type="datetimeFigureOut">
               <a:rPr lang="en-US" smtClean="0"/>
-              <a:t>9/8/2022</a:t>
+              <a:t>9/9/2022</a:t>
             </a:fld>
             <a:endParaRPr lang="en-US"/>
           </a:p>
@@ -4014,7 +4001,7 @@
           <a:p>
             <a:fld id="{973BC00D-352D-4681-8132-8CC5EB9D512D}" type="datetimeFigureOut">
               <a:rPr lang="en-US" smtClean="0"/>
-              <a:t>9/8/2022</a:t>
+              <a:t>9/9/2022</a:t>
             </a:fld>
             <a:endParaRPr lang="en-US"/>
           </a:p>
@@ -4155,7 +4142,7 @@
           <a:p>
             <a:fld id="{973BC00D-352D-4681-8132-8CC5EB9D512D}" type="datetimeFigureOut">
               <a:rPr lang="en-US" smtClean="0"/>
-              <a:t>9/8/2022</a:t>
+              <a:t>9/9/2022</a:t>
             </a:fld>
             <a:endParaRPr lang="en-US"/>
           </a:p>
@@ -4268,7 +4255,7 @@
           <a:p>
             <a:fld id="{973BC00D-352D-4681-8132-8CC5EB9D512D}" type="datetimeFigureOut">
               <a:rPr lang="en-US" smtClean="0"/>
-              <a:t>9/8/2022</a:t>
+              <a:t>9/9/2022</a:t>
             </a:fld>
             <a:endParaRPr lang="en-US"/>
           </a:p>
@@ -4579,7 +4566,7 @@
           <a:p>
             <a:fld id="{973BC00D-352D-4681-8132-8CC5EB9D512D}" type="datetimeFigureOut">
               <a:rPr lang="en-US" smtClean="0"/>
-              <a:t>9/8/2022</a:t>
+              <a:t>9/9/2022</a:t>
             </a:fld>
             <a:endParaRPr lang="en-US"/>
           </a:p>
@@ -4867,7 +4854,7 @@
           <a:p>
             <a:fld id="{973BC00D-352D-4681-8132-8CC5EB9D512D}" type="datetimeFigureOut">
               <a:rPr lang="en-US" smtClean="0"/>
-              <a:t>9/8/2022</a:t>
+              <a:t>9/9/2022</a:t>
             </a:fld>
             <a:endParaRPr lang="en-US"/>
           </a:p>
@@ -5108,7 +5095,7 @@
           <a:p>
             <a:fld id="{973BC00D-352D-4681-8132-8CC5EB9D512D}" type="datetimeFigureOut">
               <a:rPr lang="en-US" smtClean="0"/>
-              <a:t>9/8/2022</a:t>
+              <a:t>9/9/2022</a:t>
             </a:fld>
             <a:endParaRPr lang="en-US"/>
           </a:p>
@@ -5913,15 +5900,7 @@
           <a:p>
             <a:r>
               <a:rPr lang="en-US" sz="4400" dirty="0"/>
-              <a:t>You can find the code for each story in the </a:t>
-            </a:r>
-            <a:r>
-              <a:rPr lang="en-US" sz="4400" dirty="0" err="1"/>
-              <a:t>github</a:t>
-            </a:r>
-            <a:r>
-              <a:rPr lang="en-US" sz="4400" dirty="0"/>
-              <a:t> repository</a:t>
+              <a:t>You can find the code for each story in the GitHub repository</a:t>
             </a:r>
             <a:endParaRPr lang="da-DK" sz="4400" dirty="0"/>
           </a:p>
@@ -7160,8 +7139,8 @@
         </p:nvSpPr>
         <p:spPr>
           <a:xfrm>
-            <a:off x="1901567" y="3044279"/>
-            <a:ext cx="6267037" cy="769441"/>
+            <a:off x="1056736" y="2807611"/>
+            <a:ext cx="8174867" cy="1446550"/>
           </a:xfrm>
           <a:prstGeom prst="rect">
             <a:avLst/>
@@ -7177,6 +7156,12 @@
             <a:r>
               <a:rPr lang="da-DK" sz="4400" dirty="0"/>
               <a:t>Take home exercises/ideas</a:t>
+            </a:r>
+          </a:p>
+          <a:p>
+            <a:r>
+              <a:rPr lang="da-DK" sz="4400" dirty="0"/>
+              <a:t>(not compulsory - no assignment)</a:t>
             </a:r>
             <a:endParaRPr lang="en-US" sz="4400" dirty="0"/>
           </a:p>
@@ -7911,7 +7896,7 @@
         <p:spPr>
           <a:xfrm>
             <a:off x="4990985" y="3044279"/>
-            <a:ext cx="2210029" cy="769441"/>
+            <a:ext cx="2144305" cy="769441"/>
           </a:xfrm>
           <a:prstGeom prst="rect">
             <a:avLst/>
@@ -7925,8 +7910,8 @@
           <a:lstStyle/>
           <a:p>
             <a:r>
-              <a:rPr lang="en-US" sz="4400"/>
-              <a:t>Wrap Up</a:t>
+              <a:rPr lang="en-US" sz="4400" dirty="0"/>
+              <a:t>Wrap up</a:t>
             </a:r>
           </a:p>
         </p:txBody>
@@ -7935,66 +7920,6 @@
     <p:extLst>
       <p:ext uri="{BB962C8B-B14F-4D97-AF65-F5344CB8AC3E}">
         <p14:creationId xmlns:p14="http://schemas.microsoft.com/office/powerpoint/2010/main" val="2805933387"/>
-      </p:ext>
-    </p:extLst>
-  </p:cSld>
-  <p:clrMapOvr>
-    <a:masterClrMapping/>
-  </p:clrMapOvr>
-</p:sld>
-</file>
-
-<file path=ppt/slides/slide25.xml><?xml version="1.0" encoding="utf-8"?>
-<p:sld xmlns:a="http://schemas.openxmlformats.org/drawingml/2006/main" xmlns:r="http://schemas.openxmlformats.org/officeDocument/2006/relationships" xmlns:p="http://schemas.openxmlformats.org/presentationml/2006/main">
-  <p:cSld>
-    <p:spTree>
-      <p:nvGrpSpPr>
-        <p:cNvPr id="1" name=""/>
-        <p:cNvGrpSpPr/>
-        <p:nvPr/>
-      </p:nvGrpSpPr>
-      <p:grpSpPr>
-        <a:xfrm>
-          <a:off x="0" y="0"/>
-          <a:ext cx="0" cy="0"/>
-          <a:chOff x="0" y="0"/>
-          <a:chExt cx="0" cy="0"/>
-        </a:xfrm>
-      </p:grpSpPr>
-      <p:pic>
-        <p:nvPicPr>
-          <p:cNvPr id="2" name="Picture 1">
-            <a:extLst>
-              <a:ext uri="{FF2B5EF4-FFF2-40B4-BE49-F238E27FC236}">
-                <a16:creationId xmlns:a16="http://schemas.microsoft.com/office/drawing/2014/main" id="{3576221B-5445-C99C-807A-E57066650809}"/>
-              </a:ext>
-            </a:extLst>
-          </p:cNvPr>
-          <p:cNvPicPr>
-            <a:picLocks noChangeAspect="1"/>
-          </p:cNvPicPr>
-          <p:nvPr/>
-        </p:nvPicPr>
-        <p:blipFill>
-          <a:blip r:embed="rId3"/>
-          <a:stretch>
-            <a:fillRect/>
-          </a:stretch>
-        </p:blipFill>
-        <p:spPr>
-          <a:xfrm>
-            <a:off x="2905648" y="1305857"/>
-            <a:ext cx="6380704" cy="4246286"/>
-          </a:xfrm>
-          <a:prstGeom prst="rect">
-            <a:avLst/>
-          </a:prstGeom>
-        </p:spPr>
-      </p:pic>
-    </p:spTree>
-    <p:extLst>
-      <p:ext uri="{BB962C8B-B14F-4D97-AF65-F5344CB8AC3E}">
-        <p14:creationId xmlns:p14="http://schemas.microsoft.com/office/powerpoint/2010/main" val="2185139754"/>
       </p:ext>
     </p:extLst>
   </p:cSld>
@@ -8306,7 +8231,7 @@
             <a:pPr algn="ctr"/>
             <a:r>
               <a:rPr lang="en-US" dirty="0"/>
-              <a:t>Server</a:t>
+              <a:t>API</a:t>
             </a:r>
           </a:p>
         </p:txBody>
@@ -8355,7 +8280,7 @@
             <a:pPr algn="ctr"/>
             <a:r>
               <a:rPr lang="en-US" dirty="0"/>
-              <a:t>Browser</a:t>
+              <a:t>Frontend</a:t>
             </a:r>
           </a:p>
         </p:txBody>
@@ -9766,8 +9691,8 @@
         </p:nvCxnSpPr>
         <p:spPr>
           <a:xfrm flipH="1">
-            <a:off x="4939407" y="461802"/>
-            <a:ext cx="788942" cy="451473"/>
+            <a:off x="4878855" y="461802"/>
+            <a:ext cx="849494" cy="502758"/>
           </a:xfrm>
           <a:prstGeom prst="straightConnector1">
             <a:avLst/>
@@ -9811,7 +9736,7 @@
         </p:nvSpPr>
         <p:spPr>
           <a:xfrm>
-            <a:off x="2273363" y="74510"/>
+            <a:off x="2212811" y="125795"/>
             <a:ext cx="2666044" cy="1677530"/>
           </a:xfrm>
           <a:prstGeom prst="ellipse">

</xml_diff>